<commit_message>
Make changes to the presentation
</commit_message>
<xml_diff>
--- a/Documentation and Presentation/Project-Presentation (1).pptx
+++ b/Documentation and Presentation/Project-Presentation (1).pptx
@@ -371,7 +371,7 @@
           <a:p>
             <a:fld id="{9184DA70-C731-4C70-880D-CCD4705E623C}" type="datetime1">
               <a:rPr lang="en-US" smtClean="0"/>
-              <a:t>19-Nov-20</a:t>
+              <a:t>02-Dec-20</a:t>
             </a:fld>
             <a:endParaRPr lang="en-US" dirty="0"/>
           </a:p>
@@ -571,7 +571,7 @@
           <a:p>
             <a:fld id="{B612A279-0833-481D-8C56-F67FD0AC6C50}" type="datetime1">
               <a:rPr lang="en-US" smtClean="0"/>
-              <a:t>19-Nov-20</a:t>
+              <a:t>02-Dec-20</a:t>
             </a:fld>
             <a:endParaRPr lang="en-US" dirty="0"/>
           </a:p>
@@ -825,7 +825,7 @@
           <a:p>
             <a:fld id="{6587DA83-5663-4C9C-B9AA-0B40A3DAFF81}" type="datetime1">
               <a:rPr lang="en-US" smtClean="0"/>
-              <a:t>19-Nov-20</a:t>
+              <a:t>02-Dec-20</a:t>
             </a:fld>
             <a:endParaRPr lang="en-US" dirty="0"/>
           </a:p>
@@ -1025,7 +1025,7 @@
           <a:p>
             <a:fld id="{4BE1D723-8F53-4F53-90B0-1982A396982E}" type="datetime1">
               <a:rPr lang="en-US" smtClean="0"/>
-              <a:t>19-Nov-20</a:t>
+              <a:t>02-Dec-20</a:t>
             </a:fld>
             <a:endParaRPr lang="en-US" dirty="0"/>
           </a:p>
@@ -1410,7 +1410,7 @@
           <a:p>
             <a:fld id="{97669AF7-7BEB-44E4-9852-375E34362B5B}" type="datetime1">
               <a:rPr lang="en-US" smtClean="0"/>
-              <a:t>19-Nov-20</a:t>
+              <a:t>02-Dec-20</a:t>
             </a:fld>
             <a:endParaRPr lang="en-US" dirty="0"/>
           </a:p>
@@ -1677,7 +1677,7 @@
           <a:p>
             <a:fld id="{BAAAC38D-0552-4C82-B593-E6124DFADBE2}" type="datetime1">
               <a:rPr lang="en-US" smtClean="0"/>
-              <a:t>19-Nov-20</a:t>
+              <a:t>02-Dec-20</a:t>
             </a:fld>
             <a:endParaRPr lang="en-US" dirty="0"/>
           </a:p>
@@ -2086,7 +2086,7 @@
           <a:p>
             <a:fld id="{D9DF0F1C-5577-4ACB-BB62-DF8F3C494C7E}" type="datetime1">
               <a:rPr lang="en-US" smtClean="0"/>
-              <a:t>19-Nov-20</a:t>
+              <a:t>02-Dec-20</a:t>
             </a:fld>
             <a:endParaRPr lang="en-US" dirty="0"/>
           </a:p>
@@ -2234,7 +2234,7 @@
           <a:p>
             <a:fld id="{1775B394-D9F9-4F0C-B15D-605F45CB9E9F}" type="datetime1">
               <a:rPr lang="en-US" smtClean="0"/>
-              <a:t>19-Nov-20</a:t>
+              <a:t>02-Dec-20</a:t>
             </a:fld>
             <a:endParaRPr lang="en-US" dirty="0"/>
           </a:p>
@@ -2403,7 +2403,7 @@
           <a:p>
             <a:fld id="{39667345-2558-425A-8533-9BFDBCE15005}" type="datetime1">
               <a:rPr lang="en-US" smtClean="0"/>
-              <a:t>19-Nov-20</a:t>
+              <a:t>02-Dec-20</a:t>
             </a:fld>
             <a:endParaRPr lang="en-US" dirty="0"/>
           </a:p>
@@ -2744,7 +2744,7 @@
           <a:p>
             <a:fld id="{92BEA474-078D-4E9B-9B14-09A87B19DC46}" type="datetime1">
               <a:rPr lang="en-US" smtClean="0"/>
-              <a:t>19-Nov-20</a:t>
+              <a:t>02-Dec-20</a:t>
             </a:fld>
             <a:endParaRPr lang="en-US" dirty="0"/>
           </a:p>
@@ -3106,7 +3106,7 @@
           <a:p>
             <a:fld id="{4907D986-8816-4272-A432-0437A28A9828}" type="datetime1">
               <a:rPr lang="en-US" smtClean="0"/>
-              <a:t>19-Nov-20</a:t>
+              <a:t>02-Dec-20</a:t>
             </a:fld>
             <a:endParaRPr lang="en-US" dirty="0"/>
           </a:p>
@@ -3379,7 +3379,7 @@
           <a:p>
             <a:fld id="{62D6E202-B606-4609-B914-27C9371A1F6D}" type="datetime1">
               <a:rPr lang="en-US" smtClean="0"/>
-              <a:t>19-Nov-20</a:t>
+              <a:t>02-Dec-20</a:t>
             </a:fld>
             <a:endParaRPr lang="en-US" dirty="0"/>
           </a:p>
@@ -4497,7 +4497,7 @@
         </p:blipFill>
         <p:spPr>
           <a:xfrm>
-            <a:off x="1031509" y="2472903"/>
+            <a:off x="0" y="2500410"/>
             <a:ext cx="3031484" cy="3031484"/>
           </a:xfrm>
           <a:prstGeom prst="rect">
@@ -4523,8 +4523,8 @@
         </p:nvSpPr>
         <p:spPr>
           <a:xfrm>
-            <a:off x="4706460" y="2108201"/>
-            <a:ext cx="6388260" cy="3760891"/>
+            <a:off x="3195202" y="2102187"/>
+            <a:ext cx="8996798" cy="3423702"/>
           </a:xfrm>
         </p:spPr>
         <p:txBody>
@@ -4538,32 +4538,37 @@
               <a:buChar char="•"/>
             </a:pPr>
             <a:r>
+              <a:rPr lang="en-US" dirty="0"/>
+              <a:t>Radoslav </a:t>
+            </a:r>
+            <a:r>
               <a:rPr lang="en-US" dirty="0" err="1"/>
-              <a:t>Radoslav</a:t>
+              <a:t>Lisitsov</a:t>
             </a:r>
             <a:r>
               <a:rPr lang="en-US" dirty="0"/>
               <a:t> </a:t>
             </a:r>
             <a:r>
-              <a:rPr lang="en-US" dirty="0" err="1"/>
-              <a:t>Lisitsov</a:t>
-            </a:r>
-            <a:r>
-              <a:rPr lang="en-US" dirty="0"/>
-              <a:t> </a:t>
-            </a:r>
-            <a:r>
               <a:rPr lang="bg-BG" dirty="0"/>
               <a:t>- </a:t>
             </a:r>
             <a:r>
               <a:rPr lang="en-US" dirty="0">
-                <a:hlinkClick r:id="rId4"/>
+                <a:hlinkClick r:id="rId4">
+                  <a:extLst>
+                    <a:ext uri="{A12FA001-AC4F-418D-AE19-62706E023703}">
+                      <ahyp:hlinkClr xmlns:ahyp="http://schemas.microsoft.com/office/drawing/2018/hyperlinkcolor" val="tx"/>
+                    </a:ext>
+                  </a:extLst>
+                </a:hlinkClick>
               </a:rPr>
               <a:t>RPLisitsov19@codingburgas.bg</a:t>
             </a:r>
-            <a:endParaRPr lang="en-US" dirty="0"/>
+            <a:r>
+              <a:rPr lang="en-US" dirty="0"/>
+              <a:t> (Scrum Trainer)</a:t>
+            </a:r>
           </a:p>
           <a:p>
             <a:pPr>
@@ -4584,11 +4589,28 @@
             </a:r>
             <a:r>
               <a:rPr lang="en-US" dirty="0">
-                <a:hlinkClick r:id="rId5"/>
+                <a:hlinkClick r:id="rId5">
+                  <a:extLst>
+                    <a:ext uri="{A12FA001-AC4F-418D-AE19-62706E023703}">
+                      <ahyp:hlinkClr xmlns:ahyp="http://schemas.microsoft.com/office/drawing/2018/hyperlinkcolor" val="tx"/>
+                    </a:ext>
+                  </a:extLst>
+                </a:hlinkClick>
               </a:rPr>
-              <a:t>KIIwanowa19@codingburgas.bg</a:t>
-            </a:r>
-            <a:endParaRPr lang="en-US" dirty="0"/>
+              <a:t>KIIvanova19@codingburgas.bg</a:t>
+            </a:r>
+            <a:r>
+              <a:rPr lang="en-US" dirty="0"/>
+              <a:t> (Developer</a:t>
+            </a:r>
+            <a:r>
+              <a:rPr lang="bg-BG" dirty="0"/>
+              <a:t> 1 </a:t>
+            </a:r>
+            <a:r>
+              <a:rPr lang="en-US" dirty="0"/>
+              <a:t>Front End)</a:t>
+            </a:r>
           </a:p>
           <a:p>
             <a:pPr>
@@ -4609,11 +4631,28 @@
             </a:r>
             <a:r>
               <a:rPr lang="en-US" dirty="0">
-                <a:hlinkClick r:id="rId6"/>
+                <a:hlinkClick r:id="rId6">
+                  <a:extLst>
+                    <a:ext uri="{A12FA001-AC4F-418D-AE19-62706E023703}">
+                      <ahyp:hlinkClr xmlns:ahyp="http://schemas.microsoft.com/office/drawing/2018/hyperlinkcolor" val="tx"/>
+                    </a:ext>
+                  </a:extLst>
+                </a:hlinkClick>
               </a:rPr>
               <a:t>MDKostova19@codingburgas.bg</a:t>
             </a:r>
-            <a:endParaRPr lang="en-US" dirty="0"/>
+            <a:r>
+              <a:rPr lang="en-US" dirty="0"/>
+              <a:t> (Developer</a:t>
+            </a:r>
+            <a:r>
+              <a:rPr lang="bg-BG" dirty="0"/>
+              <a:t> 1 </a:t>
+            </a:r>
+            <a:r>
+              <a:rPr lang="en-US" dirty="0"/>
+              <a:t>Front End)</a:t>
+            </a:r>
           </a:p>
           <a:p>
             <a:pPr>
@@ -4638,11 +4677,36 @@
             </a:r>
             <a:r>
               <a:rPr lang="en-US" dirty="0">
-                <a:hlinkClick r:id="rId7"/>
+                <a:hlinkClick r:id="rId7">
+                  <a:extLst>
+                    <a:ext uri="{A12FA001-AC4F-418D-AE19-62706E023703}">
+                      <ahyp:hlinkClr xmlns:ahyp="http://schemas.microsoft.com/office/drawing/2018/hyperlinkcolor" val="tx"/>
+                    </a:ext>
+                  </a:extLst>
+                </a:hlinkClick>
               </a:rPr>
               <a:t>NSRuncheva19@codingburgas.bg</a:t>
             </a:r>
-            <a:endParaRPr lang="en-US" dirty="0"/>
+            <a:r>
+              <a:rPr lang="en-US" dirty="0"/>
+              <a:t> (Developer</a:t>
+            </a:r>
+            <a:r>
+              <a:rPr lang="bg-BG" dirty="0"/>
+              <a:t> 2 </a:t>
+            </a:r>
+            <a:r>
+              <a:rPr lang="en-US" dirty="0"/>
+              <a:t>C</a:t>
+            </a:r>
+            <a:r>
+              <a:rPr lang="bg-BG" dirty="0"/>
+              <a:t>++</a:t>
+            </a:r>
+            <a:r>
+              <a:rPr lang="en-US" dirty="0"/>
+              <a:t>)</a:t>
+            </a:r>
           </a:p>
           <a:p>
             <a:pPr>
@@ -4663,11 +4727,28 @@
             </a:r>
             <a:r>
               <a:rPr lang="en-US" dirty="0">
-                <a:hlinkClick r:id="rId8"/>
+                <a:hlinkClick r:id="rId8">
+                  <a:extLst>
+                    <a:ext uri="{A12FA001-AC4F-418D-AE19-62706E023703}">
+                      <ahyp:hlinkClr xmlns:ahyp="http://schemas.microsoft.com/office/drawing/2018/hyperlinkcolor" val="tx"/>
+                    </a:ext>
+                  </a:extLst>
+                </a:hlinkClick>
               </a:rPr>
               <a:t>GAVasilev19@codingburgas.bg</a:t>
             </a:r>
-            <a:endParaRPr lang="en-US" dirty="0"/>
+            <a:r>
+              <a:rPr lang="en-US" dirty="0"/>
+              <a:t> (Developer</a:t>
+            </a:r>
+            <a:r>
+              <a:rPr lang="bg-BG" dirty="0"/>
+              <a:t> 3 </a:t>
+            </a:r>
+            <a:r>
+              <a:rPr lang="en-US" dirty="0"/>
+              <a:t>Code Checker)</a:t>
+            </a:r>
           </a:p>
           <a:p>
             <a:pPr>
@@ -4692,11 +4773,28 @@
             </a:r>
             <a:r>
               <a:rPr lang="en-US" dirty="0">
-                <a:hlinkClick r:id="rId9"/>
+                <a:hlinkClick r:id="rId9">
+                  <a:extLst>
+                    <a:ext uri="{A12FA001-AC4F-418D-AE19-62706E023703}">
+                      <ahyp:hlinkClr xmlns:ahyp="http://schemas.microsoft.com/office/drawing/2018/hyperlinkcolor" val="tx"/>
+                    </a:ext>
+                  </a:extLst>
+                </a:hlinkClick>
               </a:rPr>
               <a:t>KPNoncheva19@codingburgas.bg</a:t>
             </a:r>
-            <a:endParaRPr lang="en-US" dirty="0"/>
+            <a:r>
+              <a:rPr lang="en-US" dirty="0"/>
+              <a:t> (Developer</a:t>
+            </a:r>
+            <a:r>
+              <a:rPr lang="bg-BG" dirty="0"/>
+              <a:t> 3 </a:t>
+            </a:r>
+            <a:r>
+              <a:rPr lang="en-US" dirty="0"/>
+              <a:t>Code Checker)</a:t>
+            </a:r>
           </a:p>
           <a:p>
             <a:pPr>
@@ -6207,7 +6305,7 @@
                   <a:schemeClr val="bg1"/>
                 </a:solidFill>
               </a:rPr>
-              <a:t>Used programming languages</a:t>
+              <a:t>Used programming technologies</a:t>
             </a:r>
           </a:p>
         </p:txBody>
@@ -6336,7 +6434,7 @@
         </p:blipFill>
         <p:spPr bwMode="auto">
           <a:xfrm>
-            <a:off x="4733881" y="2853119"/>
+            <a:off x="8372408" y="2846225"/>
             <a:ext cx="2710770" cy="3047402"/>
           </a:xfrm>
           <a:prstGeom prst="rect">
@@ -6385,7 +6483,7 @@
         </p:blipFill>
         <p:spPr>
           <a:xfrm>
-            <a:off x="8806695" y="2853119"/>
+            <a:off x="4934756" y="2772211"/>
             <a:ext cx="2159971" cy="3047402"/>
           </a:xfrm>
           <a:prstGeom prst="rect">

</xml_diff>